<commit_message>
tp  reset revert checkout restore
</commit_message>
<xml_diff>
--- a/2 - Approche agile/5 - GIT/Formation Git.pptx
+++ b/2 - Approche agile/5 - GIT/Formation Git.pptx
@@ -525,6 +525,72 @@
     </a:lvl9pPr>
   </p:notesStyle>
 </p:notesMaster>
+</file>
+
+<file path=ppt/notesSlides/notesSlide1.xml><?xml version="1.0" encoding="utf-8"?>
+<p:notes xmlns:a="http://schemas.openxmlformats.org/drawingml/2006/main" xmlns:r="http://schemas.openxmlformats.org/officeDocument/2006/relationships" xmlns:p="http://schemas.openxmlformats.org/presentationml/2006/main">
+  <p:cSld>
+    <p:spTree>
+      <p:nvGrpSpPr>
+        <p:cNvPr id="1" name=""/>
+        <p:cNvGrpSpPr/>
+        <p:nvPr/>
+      </p:nvGrpSpPr>
+      <p:grpSpPr>
+        <a:xfrm>
+          <a:off x="0" y="0"/>
+          <a:ext cx="0" cy="0"/>
+          <a:chOff x="0" y="0"/>
+          <a:chExt cx="0" cy="0"/>
+        </a:xfrm>
+      </p:grpSpPr>
+      <p:sp>
+        <p:nvSpPr>
+          <p:cNvPr id="2" name="Espace réservé de l'image des diapositives 1"/>
+          <p:cNvSpPr>
+            <a:spLocks noGrp="1" noRot="1" noChangeAspect="1"/>
+          </p:cNvSpPr>
+          <p:nvPr>
+            <p:ph type="sldImg"/>
+          </p:nvPr>
+        </p:nvSpPr>
+        <p:spPr>
+          <a:xfrm>
+            <a:off x="381000" y="685800"/>
+            <a:ext cx="6096000" cy="3429000"/>
+          </a:xfrm>
+        </p:spPr>
+      </p:sp>
+      <p:sp>
+        <p:nvSpPr>
+          <p:cNvPr id="3" name="Espace réservé des notes 2"/>
+          <p:cNvSpPr>
+            <a:spLocks noGrp="1"/>
+          </p:cNvSpPr>
+          <p:nvPr>
+            <p:ph type="body" idx="1"/>
+          </p:nvPr>
+        </p:nvSpPr>
+        <p:spPr/>
+        <p:txBody>
+          <a:bodyPr/>
+          <a:lstStyle/>
+          <a:p>
+            <a:endParaRPr lang="fr-FR" dirty="0"/>
+          </a:p>
+        </p:txBody>
+      </p:sp>
+    </p:spTree>
+    <p:extLst>
+      <p:ext uri="{BB962C8B-B14F-4D97-AF65-F5344CB8AC3E}">
+        <p14:creationId xmlns:p14="http://schemas.microsoft.com/office/powerpoint/2010/main" val="1551672379"/>
+      </p:ext>
+    </p:extLst>
+  </p:cSld>
+  <p:clrMapOvr>
+    <a:masterClrMapping/>
+  </p:clrMapOvr>
+</p:notes>
 </file>
 
 <file path=ppt/slideLayouts/slideLayout1.xml><?xml version="1.0" encoding="utf-8"?>
@@ -1249,7 +1315,7 @@
           <a:p>
             <a:fld id="{4AAD347D-5ACD-4C99-B74B-A9C85AD731AF}" type="datetimeFigureOut">
               <a:rPr lang="en-US" smtClean="0"/>
-              <a:t>1/16/2024</a:t>
+              <a:t>1/20/2024</a:t>
             </a:fld>
             <a:endParaRPr lang="en-US" dirty="0"/>
           </a:p>
@@ -1500,7 +1566,7 @@
           <a:p>
             <a:fld id="{4AAD347D-5ACD-4C99-B74B-A9C85AD731AF}" type="datetimeFigureOut">
               <a:rPr lang="en-US" smtClean="0"/>
-              <a:t>1/16/2024</a:t>
+              <a:t>1/20/2024</a:t>
             </a:fld>
             <a:endParaRPr lang="en-US" dirty="0"/>
           </a:p>
@@ -1815,7 +1881,7 @@
           <a:p>
             <a:fld id="{4AAD347D-5ACD-4C99-B74B-A9C85AD731AF}" type="datetimeFigureOut">
               <a:rPr lang="en-US" smtClean="0"/>
-              <a:t>1/16/2024</a:t>
+              <a:t>1/20/2024</a:t>
             </a:fld>
             <a:endParaRPr lang="en-US" dirty="0"/>
           </a:p>
@@ -2157,7 +2223,7 @@
           <a:p>
             <a:fld id="{4509A250-FF31-4206-8172-F9D3106AACB1}" type="datetimeFigureOut">
               <a:rPr lang="en-US" smtClean="0"/>
-              <a:t>1/16/2024</a:t>
+              <a:t>1/20/2024</a:t>
             </a:fld>
             <a:endParaRPr lang="en-US" dirty="0"/>
           </a:p>
@@ -2472,7 +2538,7 @@
           <a:p>
             <a:fld id="{4AAD347D-5ACD-4C99-B74B-A9C85AD731AF}" type="datetimeFigureOut">
               <a:rPr lang="en-US" smtClean="0"/>
-              <a:t>1/16/2024</a:t>
+              <a:t>1/20/2024</a:t>
             </a:fld>
             <a:endParaRPr lang="en-US" dirty="0"/>
           </a:p>
@@ -2866,7 +2932,7 @@
           <a:p>
             <a:fld id="{4AAD347D-5ACD-4C99-B74B-A9C85AD731AF}" type="datetimeFigureOut">
               <a:rPr lang="en-US" smtClean="0"/>
-              <a:t>1/16/2024</a:t>
+              <a:t>1/20/2024</a:t>
             </a:fld>
             <a:endParaRPr lang="en-US" dirty="0"/>
           </a:p>
@@ -3037,7 +3103,7 @@
           <a:p>
             <a:fld id="{4509A250-FF31-4206-8172-F9D3106AACB1}" type="datetimeFigureOut">
               <a:rPr lang="en-US" smtClean="0"/>
-              <a:t>1/16/2024</a:t>
+              <a:t>1/20/2024</a:t>
             </a:fld>
             <a:endParaRPr lang="en-US" dirty="0"/>
           </a:p>
@@ -3218,7 +3284,7 @@
           <a:p>
             <a:fld id="{4509A250-FF31-4206-8172-F9D3106AACB1}" type="datetimeFigureOut">
               <a:rPr lang="en-US" smtClean="0"/>
-              <a:t>1/16/2024</a:t>
+              <a:t>1/20/2024</a:t>
             </a:fld>
             <a:endParaRPr lang="en-US" dirty="0"/>
           </a:p>
@@ -3395,7 +3461,7 @@
           <a:p>
             <a:fld id="{4509A250-FF31-4206-8172-F9D3106AACB1}" type="datetimeFigureOut">
               <a:rPr lang="en-US" smtClean="0"/>
-              <a:t>1/16/2024</a:t>
+              <a:t>1/20/2024</a:t>
             </a:fld>
             <a:endParaRPr lang="en-US" dirty="0"/>
           </a:p>
@@ -3643,7 +3709,7 @@
           <a:p>
             <a:fld id="{9796027F-7875-4030-9381-8BD8C4F21935}" type="datetimeFigureOut">
               <a:rPr lang="en-US" smtClean="0"/>
-              <a:t>1/16/2024</a:t>
+              <a:t>1/20/2024</a:t>
             </a:fld>
             <a:endParaRPr lang="en-US" dirty="0"/>
           </a:p>
@@ -3876,7 +3942,7 @@
           <a:p>
             <a:fld id="{9796027F-7875-4030-9381-8BD8C4F21935}" type="datetimeFigureOut">
               <a:rPr lang="en-US" smtClean="0"/>
-              <a:t>1/16/2024</a:t>
+              <a:t>1/20/2024</a:t>
             </a:fld>
             <a:endParaRPr lang="en-US" dirty="0"/>
           </a:p>
@@ -4251,7 +4317,7 @@
           <a:p>
             <a:fld id="{9796027F-7875-4030-9381-8BD8C4F21935}" type="datetimeFigureOut">
               <a:rPr lang="en-US" smtClean="0"/>
-              <a:t>1/16/2024</a:t>
+              <a:t>1/20/2024</a:t>
             </a:fld>
             <a:endParaRPr lang="en-US" dirty="0"/>
           </a:p>
@@ -4375,7 +4441,7 @@
           <a:p>
             <a:fld id="{4509A250-FF31-4206-8172-F9D3106AACB1}" type="datetimeFigureOut">
               <a:rPr lang="en-US" smtClean="0"/>
-              <a:t>1/16/2024</a:t>
+              <a:t>1/20/2024</a:t>
             </a:fld>
             <a:endParaRPr lang="en-US" dirty="0"/>
           </a:p>
@@ -4471,7 +4537,7 @@
           <a:p>
             <a:fld id="{4509A250-FF31-4206-8172-F9D3106AACB1}" type="datetimeFigureOut">
               <a:rPr lang="en-US" smtClean="0"/>
-              <a:t>1/16/2024</a:t>
+              <a:t>1/20/2024</a:t>
             </a:fld>
             <a:endParaRPr lang="en-US" dirty="0"/>
           </a:p>
@@ -4727,7 +4793,7 @@
           <a:p>
             <a:fld id="{4509A250-FF31-4206-8172-F9D3106AACB1}" type="datetimeFigureOut">
               <a:rPr lang="en-US" smtClean="0"/>
-              <a:t>1/16/2024</a:t>
+              <a:t>1/20/2024</a:t>
             </a:fld>
             <a:endParaRPr lang="en-US" dirty="0"/>
           </a:p>
@@ -4991,7 +5057,7 @@
           <a:p>
             <a:fld id="{4509A250-FF31-4206-8172-F9D3106AACB1}" type="datetimeFigureOut">
               <a:rPr lang="en-US" smtClean="0"/>
-              <a:t>1/16/2024</a:t>
+              <a:t>1/20/2024</a:t>
             </a:fld>
             <a:endParaRPr lang="en-US" dirty="0"/>
           </a:p>
@@ -5735,7 +5801,7 @@
           <a:p>
             <a:fld id="{4AAD347D-5ACD-4C99-B74B-A9C85AD731AF}" type="datetimeFigureOut">
               <a:rPr lang="en-US" smtClean="0"/>
-              <a:t>1/16/2024</a:t>
+              <a:t>1/20/2024</a:t>
             </a:fld>
             <a:endParaRPr lang="en-US" dirty="0"/>
           </a:p>
@@ -11598,69 +11664,6 @@
             </a:r>
           </a:p>
           <a:p>
-            <a:r>
-              <a:rPr lang="fr-FR" dirty="0"/>
-              <a:t>Consultez le </a:t>
-            </a:r>
-            <a:r>
-              <a:rPr lang="fr-FR" dirty="0" err="1"/>
-              <a:t>status</a:t>
-            </a:r>
-            <a:r>
-              <a:rPr lang="fr-FR" dirty="0"/>
-              <a:t> de votre repo</a:t>
-            </a:r>
-          </a:p>
-          <a:p>
-            <a:r>
-              <a:rPr lang="fr-FR" dirty="0"/>
-              <a:t>Tapez </a:t>
-            </a:r>
-            <a:r>
-              <a:rPr lang="fr-FR" b="1" dirty="0">
-                <a:solidFill>
-                  <a:srgbClr val="FF0000"/>
-                </a:solidFill>
-              </a:rPr>
-              <a:t>git restore –</a:t>
-            </a:r>
-            <a:r>
-              <a:rPr lang="fr-FR" b="1" dirty="0" err="1">
-                <a:solidFill>
-                  <a:srgbClr val="FF0000"/>
-                </a:solidFill>
-              </a:rPr>
-              <a:t>staged</a:t>
-            </a:r>
-            <a:r>
-              <a:rPr lang="fr-FR" b="1" dirty="0">
-                <a:solidFill>
-                  <a:srgbClr val="FF0000"/>
-                </a:solidFill>
-              </a:rPr>
-              <a:t> </a:t>
-            </a:r>
-            <a:r>
-              <a:rPr lang="fr-FR" b="1" dirty="0" err="1">
-                <a:solidFill>
-                  <a:srgbClr val="FF0000"/>
-                </a:solidFill>
-              </a:rPr>
-              <a:t>produit.php</a:t>
-            </a:r>
-            <a:endParaRPr lang="fr-FR" b="1" dirty="0">
-              <a:solidFill>
-                <a:srgbClr val="FF0000"/>
-              </a:solidFill>
-            </a:endParaRPr>
-          </a:p>
-          <a:p>
-            <a:r>
-              <a:rPr lang="fr-FR" dirty="0"/>
-              <a:t>Consulter votre fichier</a:t>
-            </a:r>
-          </a:p>
-          <a:p>
             <a:endParaRPr lang="fr-FR" dirty="0"/>
           </a:p>
         </p:txBody>
@@ -11992,7 +11995,7 @@
                   <a:srgbClr val="FF0000"/>
                 </a:solidFill>
               </a:rPr>
-              <a:t>staget</a:t>
+              <a:t>staged</a:t>
             </a:r>
             <a:r>
               <a:rPr lang="fr-FR" sz="1600" b="1" dirty="0">
@@ -16914,7 +16917,7 @@
           <a:p>
             <a:r>
               <a:rPr lang="fr-FR" dirty="0"/>
-              <a:t>Apply applique tous le contenu du </a:t>
+              <a:t>Apply applique le contenu du dernier </a:t>
             </a:r>
             <a:r>
               <a:rPr lang="fr-FR" dirty="0" err="1"/>
@@ -16922,13 +16925,8 @@
             </a:r>
             <a:r>
               <a:rPr lang="fr-FR" dirty="0"/>
-              <a:t> sans supprimer le </a:t>
-            </a:r>
-            <a:r>
-              <a:rPr lang="fr-FR" dirty="0" err="1"/>
-              <a:t>stash</a:t>
-            </a:r>
-            <a:endParaRPr lang="fr-FR" dirty="0"/>
+              <a:t> sans le supprimer </a:t>
+            </a:r>
           </a:p>
           <a:p>
             <a:r>
@@ -17036,15 +17034,7 @@
           <a:p>
             <a:r>
               <a:rPr lang="fr-FR" dirty="0"/>
-              <a:t>Pop applique tous le </a:t>
-            </a:r>
-            <a:r>
-              <a:rPr lang="fr-FR" dirty="0" err="1"/>
-              <a:t>contnu</a:t>
-            </a:r>
-            <a:r>
-              <a:rPr lang="fr-FR" dirty="0"/>
-              <a:t> du </a:t>
+              <a:t>Pop applique tous le contenu du dernier </a:t>
             </a:r>
             <a:r>
               <a:rPr lang="fr-FR" dirty="0" err="1"/>
@@ -17052,11 +17042,11 @@
             </a:r>
             <a:r>
               <a:rPr lang="fr-FR" dirty="0"/>
-              <a:t> et vide le </a:t>
+              <a:t> et le supprime de la </a:t>
             </a:r>
             <a:r>
               <a:rPr lang="fr-FR" dirty="0" err="1"/>
-              <a:t>stash</a:t>
+              <a:t>list</a:t>
             </a:r>
             <a:endParaRPr lang="fr-FR" dirty="0"/>
           </a:p>
@@ -17350,7 +17340,7 @@
           <a:p>
             <a:r>
               <a:rPr lang="fr-FR" sz="2400" dirty="0"/>
-              <a:t>Pour vider le </a:t>
+              <a:t>Pour supprimer le dernier </a:t>
             </a:r>
             <a:r>
               <a:rPr lang="fr-FR" sz="2400" dirty="0" err="1"/>
@@ -17386,6 +17376,56 @@
               </a:rPr>
               <a:t> drop</a:t>
             </a:r>
+          </a:p>
+          <a:p>
+            <a:r>
+              <a:rPr lang="fr-FR" sz="2400" dirty="0"/>
+              <a:t>Pour supprimer tous le contenu du </a:t>
+            </a:r>
+            <a:r>
+              <a:rPr lang="fr-FR" sz="2400" dirty="0" err="1"/>
+              <a:t>stash</a:t>
+            </a:r>
+            <a:endParaRPr lang="fr-FR" sz="2400" dirty="0"/>
+          </a:p>
+          <a:p>
+            <a:r>
+              <a:rPr lang="fr-FR" sz="2400" b="1" dirty="0">
+                <a:solidFill>
+                  <a:srgbClr val="FF0000"/>
+                </a:solidFill>
+              </a:rPr>
+              <a:t>git </a:t>
+            </a:r>
+            <a:r>
+              <a:rPr lang="fr-FR" sz="2400" b="1" dirty="0" err="1">
+                <a:solidFill>
+                  <a:srgbClr val="FF0000"/>
+                </a:solidFill>
+              </a:rPr>
+              <a:t>stash</a:t>
+            </a:r>
+            <a:r>
+              <a:rPr lang="fr-FR" sz="2400" b="1" dirty="0">
+                <a:solidFill>
+                  <a:srgbClr val="FF0000"/>
+                </a:solidFill>
+              </a:rPr>
+              <a:t> </a:t>
+            </a:r>
+            <a:r>
+              <a:rPr lang="fr-FR" sz="2400" b="1" dirty="0" err="1">
+                <a:solidFill>
+                  <a:srgbClr val="FF0000"/>
+                </a:solidFill>
+              </a:rPr>
+              <a:t>clear</a:t>
+            </a:r>
+            <a:endParaRPr lang="fr-FR" sz="2400" b="1" dirty="0">
+              <a:solidFill>
+                <a:srgbClr val="FF0000"/>
+              </a:solidFill>
+            </a:endParaRPr>
           </a:p>
           <a:p>
             <a:endParaRPr lang="fr-FR" sz="2400" dirty="0"/>

</xml_diff>